<commit_message>
add Cu Rh Ru
</commit_message>
<xml_diff>
--- a/zyj/声子谱.pptx
+++ b/zyj/声子谱.pptx
@@ -11,6 +11,9 @@
     <p:sldId id="257" r:id="rId5"/>
     <p:sldId id="258" r:id="rId6"/>
     <p:sldId id="259" r:id="rId7"/>
+    <p:sldId id="262" r:id="rId8"/>
+    <p:sldId id="263" r:id="rId9"/>
+    <p:sldId id="264" r:id="rId10"/>
   </p:sldIdLst>
   <p:sldSz cx="12192000" cy="6858000"/>
   <p:notesSz cx="6858000" cy="9144000"/>
@@ -264,7 +267,7 @@
           <a:p>
             <a:fld id="{33F4C065-F663-4831-9C87-52E6E8662FCD}" type="datetimeFigureOut">
               <a:rPr lang="zh-CN" altLang="en-US" smtClean="0"/>
-              <a:t>2021/3/20</a:t>
+              <a:t>2021/4/10</a:t>
             </a:fld>
             <a:endParaRPr lang="zh-CN" altLang="en-US"/>
           </a:p>
@@ -462,7 +465,7 @@
           <a:p>
             <a:fld id="{33F4C065-F663-4831-9C87-52E6E8662FCD}" type="datetimeFigureOut">
               <a:rPr lang="zh-CN" altLang="en-US" smtClean="0"/>
-              <a:t>2021/3/20</a:t>
+              <a:t>2021/4/10</a:t>
             </a:fld>
             <a:endParaRPr lang="zh-CN" altLang="en-US"/>
           </a:p>
@@ -670,7 +673,7 @@
           <a:p>
             <a:fld id="{33F4C065-F663-4831-9C87-52E6E8662FCD}" type="datetimeFigureOut">
               <a:rPr lang="zh-CN" altLang="en-US" smtClean="0"/>
-              <a:t>2021/3/20</a:t>
+              <a:t>2021/4/10</a:t>
             </a:fld>
             <a:endParaRPr lang="zh-CN" altLang="en-US"/>
           </a:p>
@@ -868,7 +871,7 @@
           <a:p>
             <a:fld id="{33F4C065-F663-4831-9C87-52E6E8662FCD}" type="datetimeFigureOut">
               <a:rPr lang="zh-CN" altLang="en-US" smtClean="0"/>
-              <a:t>2021/3/20</a:t>
+              <a:t>2021/4/10</a:t>
             </a:fld>
             <a:endParaRPr lang="zh-CN" altLang="en-US"/>
           </a:p>
@@ -1143,7 +1146,7 @@
           <a:p>
             <a:fld id="{33F4C065-F663-4831-9C87-52E6E8662FCD}" type="datetimeFigureOut">
               <a:rPr lang="zh-CN" altLang="en-US" smtClean="0"/>
-              <a:t>2021/3/20</a:t>
+              <a:t>2021/4/10</a:t>
             </a:fld>
             <a:endParaRPr lang="zh-CN" altLang="en-US"/>
           </a:p>
@@ -1408,7 +1411,7 @@
           <a:p>
             <a:fld id="{33F4C065-F663-4831-9C87-52E6E8662FCD}" type="datetimeFigureOut">
               <a:rPr lang="zh-CN" altLang="en-US" smtClean="0"/>
-              <a:t>2021/3/20</a:t>
+              <a:t>2021/4/10</a:t>
             </a:fld>
             <a:endParaRPr lang="zh-CN" altLang="en-US"/>
           </a:p>
@@ -1820,7 +1823,7 @@
           <a:p>
             <a:fld id="{33F4C065-F663-4831-9C87-52E6E8662FCD}" type="datetimeFigureOut">
               <a:rPr lang="zh-CN" altLang="en-US" smtClean="0"/>
-              <a:t>2021/3/20</a:t>
+              <a:t>2021/4/10</a:t>
             </a:fld>
             <a:endParaRPr lang="zh-CN" altLang="en-US"/>
           </a:p>
@@ -1961,7 +1964,7 @@
           <a:p>
             <a:fld id="{33F4C065-F663-4831-9C87-52E6E8662FCD}" type="datetimeFigureOut">
               <a:rPr lang="zh-CN" altLang="en-US" smtClean="0"/>
-              <a:t>2021/3/20</a:t>
+              <a:t>2021/4/10</a:t>
             </a:fld>
             <a:endParaRPr lang="zh-CN" altLang="en-US"/>
           </a:p>
@@ -2074,7 +2077,7 @@
           <a:p>
             <a:fld id="{33F4C065-F663-4831-9C87-52E6E8662FCD}" type="datetimeFigureOut">
               <a:rPr lang="zh-CN" altLang="en-US" smtClean="0"/>
-              <a:t>2021/3/20</a:t>
+              <a:t>2021/4/10</a:t>
             </a:fld>
             <a:endParaRPr lang="zh-CN" altLang="en-US"/>
           </a:p>
@@ -2385,7 +2388,7 @@
           <a:p>
             <a:fld id="{33F4C065-F663-4831-9C87-52E6E8662FCD}" type="datetimeFigureOut">
               <a:rPr lang="zh-CN" altLang="en-US" smtClean="0"/>
-              <a:t>2021/3/20</a:t>
+              <a:t>2021/4/10</a:t>
             </a:fld>
             <a:endParaRPr lang="zh-CN" altLang="en-US"/>
           </a:p>
@@ -2673,7 +2676,7 @@
           <a:p>
             <a:fld id="{33F4C065-F663-4831-9C87-52E6E8662FCD}" type="datetimeFigureOut">
               <a:rPr lang="zh-CN" altLang="en-US" smtClean="0"/>
-              <a:t>2021/3/20</a:t>
+              <a:t>2021/4/10</a:t>
             </a:fld>
             <a:endParaRPr lang="zh-CN" altLang="en-US"/>
           </a:p>
@@ -2914,7 +2917,7 @@
           <a:p>
             <a:fld id="{33F4C065-F663-4831-9C87-52E6E8662FCD}" type="datetimeFigureOut">
               <a:rPr lang="zh-CN" altLang="en-US" smtClean="0"/>
-              <a:t>2021/3/20</a:t>
+              <a:t>2021/4/10</a:t>
             </a:fld>
             <a:endParaRPr lang="zh-CN" altLang="en-US"/>
           </a:p>
@@ -4280,6 +4283,378 @@
 </p:sld>
 </file>
 
+<file path=ppt/slides/slide7.xml><?xml version="1.0" encoding="utf-8"?>
+<p:sld xmlns:a="http://schemas.openxmlformats.org/drawingml/2006/main" xmlns:r="http://schemas.openxmlformats.org/officeDocument/2006/relationships" xmlns:p="http://schemas.openxmlformats.org/presentationml/2006/main">
+  <p:cSld>
+    <p:spTree>
+      <p:nvGrpSpPr>
+        <p:cNvPr id="1" name=""/>
+        <p:cNvGrpSpPr/>
+        <p:nvPr/>
+      </p:nvGrpSpPr>
+      <p:grpSpPr>
+        <a:xfrm>
+          <a:off x="0" y="0"/>
+          <a:ext cx="0" cy="0"/>
+          <a:chOff x="0" y="0"/>
+          <a:chExt cx="0" cy="0"/>
+        </a:xfrm>
+      </p:grpSpPr>
+      <p:sp>
+        <p:nvSpPr>
+          <p:cNvPr id="2" name="文本框 1">
+            <a:extLst>
+              <a:ext uri="{FF2B5EF4-FFF2-40B4-BE49-F238E27FC236}">
+                <a16:creationId xmlns:a16="http://schemas.microsoft.com/office/drawing/2014/main" id="{0172D586-0AB7-45E7-B70E-08370A07B73C}"/>
+              </a:ext>
+            </a:extLst>
+          </p:cNvPr>
+          <p:cNvSpPr txBox="1"/>
+          <p:nvPr/>
+        </p:nvSpPr>
+        <p:spPr>
+          <a:xfrm>
+            <a:off x="7456602" y="518474"/>
+            <a:ext cx="2469823" cy="369332"/>
+          </a:xfrm>
+          <a:prstGeom prst="rect">
+            <a:avLst/>
+          </a:prstGeom>
+          <a:noFill/>
+        </p:spPr>
+        <p:txBody>
+          <a:bodyPr wrap="square" rtlCol="0">
+            <a:spAutoFit/>
+          </a:bodyPr>
+          <a:lstStyle/>
+          <a:p>
+            <a:r>
+              <a:rPr lang="en-US" altLang="zh-CN" dirty="0"/>
+              <a:t>Cu(OH)2</a:t>
+            </a:r>
+            <a:endParaRPr lang="zh-CN" altLang="en-US" dirty="0"/>
+          </a:p>
+        </p:txBody>
+      </p:sp>
+      <p:pic>
+        <p:nvPicPr>
+          <p:cNvPr id="4" name="图片 3">
+            <a:extLst>
+              <a:ext uri="{FF2B5EF4-FFF2-40B4-BE49-F238E27FC236}">
+                <a16:creationId xmlns:a16="http://schemas.microsoft.com/office/drawing/2014/main" id="{1D904D87-8F1D-429F-9B66-C5E871715975}"/>
+              </a:ext>
+            </a:extLst>
+          </p:cNvPr>
+          <p:cNvPicPr>
+            <a:picLocks noChangeAspect="1"/>
+          </p:cNvPicPr>
+          <p:nvPr/>
+        </p:nvPicPr>
+        <p:blipFill>
+          <a:blip r:embed="rId2"/>
+          <a:stretch>
+            <a:fillRect/>
+          </a:stretch>
+        </p:blipFill>
+        <p:spPr>
+          <a:xfrm>
+            <a:off x="626386" y="703140"/>
+            <a:ext cx="5113463" cy="3817951"/>
+          </a:xfrm>
+          <a:prstGeom prst="rect">
+            <a:avLst/>
+          </a:prstGeom>
+        </p:spPr>
+      </p:pic>
+    </p:spTree>
+    <p:extLst>
+      <p:ext uri="{BB962C8B-B14F-4D97-AF65-F5344CB8AC3E}">
+        <p14:creationId xmlns:p14="http://schemas.microsoft.com/office/powerpoint/2010/main" val="2119297425"/>
+      </p:ext>
+    </p:extLst>
+  </p:cSld>
+  <p:clrMapOvr>
+    <a:masterClrMapping/>
+  </p:clrMapOvr>
+</p:sld>
+</file>
+
+<file path=ppt/slides/slide8.xml><?xml version="1.0" encoding="utf-8"?>
+<p:sld xmlns:a="http://schemas.openxmlformats.org/drawingml/2006/main" xmlns:r="http://schemas.openxmlformats.org/officeDocument/2006/relationships" xmlns:p="http://schemas.openxmlformats.org/presentationml/2006/main">
+  <p:cSld>
+    <p:spTree>
+      <p:nvGrpSpPr>
+        <p:cNvPr id="1" name=""/>
+        <p:cNvGrpSpPr/>
+        <p:nvPr/>
+      </p:nvGrpSpPr>
+      <p:grpSpPr>
+        <a:xfrm>
+          <a:off x="0" y="0"/>
+          <a:ext cx="0" cy="0"/>
+          <a:chOff x="0" y="0"/>
+          <a:chExt cx="0" cy="0"/>
+        </a:xfrm>
+      </p:grpSpPr>
+      <p:sp>
+        <p:nvSpPr>
+          <p:cNvPr id="2" name="文本框 1">
+            <a:extLst>
+              <a:ext uri="{FF2B5EF4-FFF2-40B4-BE49-F238E27FC236}">
+                <a16:creationId xmlns:a16="http://schemas.microsoft.com/office/drawing/2014/main" id="{CF8E6300-6742-457C-ADE9-DE9E5C7427CE}"/>
+              </a:ext>
+            </a:extLst>
+          </p:cNvPr>
+          <p:cNvSpPr txBox="1"/>
+          <p:nvPr/>
+        </p:nvSpPr>
+        <p:spPr>
+          <a:xfrm>
+            <a:off x="7202078" y="857839"/>
+            <a:ext cx="2460396" cy="369332"/>
+          </a:xfrm>
+          <a:prstGeom prst="rect">
+            <a:avLst/>
+          </a:prstGeom>
+          <a:noFill/>
+        </p:spPr>
+        <p:txBody>
+          <a:bodyPr wrap="square" rtlCol="0">
+            <a:spAutoFit/>
+          </a:bodyPr>
+          <a:lstStyle/>
+          <a:p>
+            <a:r>
+              <a:rPr lang="en-US" altLang="zh-CN" dirty="0"/>
+              <a:t>Rh(OH)2</a:t>
+            </a:r>
+            <a:endParaRPr lang="zh-CN" altLang="en-US" dirty="0"/>
+          </a:p>
+        </p:txBody>
+      </p:sp>
+      <p:pic>
+        <p:nvPicPr>
+          <p:cNvPr id="5" name="图片 4">
+            <a:extLst>
+              <a:ext uri="{FF2B5EF4-FFF2-40B4-BE49-F238E27FC236}">
+                <a16:creationId xmlns:a16="http://schemas.microsoft.com/office/drawing/2014/main" id="{82D8C851-1FE6-4B57-9D6B-4677030D1D73}"/>
+              </a:ext>
+            </a:extLst>
+          </p:cNvPr>
+          <p:cNvPicPr>
+            <a:picLocks noChangeAspect="1"/>
+          </p:cNvPicPr>
+          <p:nvPr/>
+        </p:nvPicPr>
+        <p:blipFill>
+          <a:blip r:embed="rId2">
+            <a:extLst>
+              <a:ext uri="{28A0092B-C50C-407E-A947-70E740481C1C}">
+                <a14:useLocalDpi xmlns:a14="http://schemas.microsoft.com/office/drawing/2010/main" val="0"/>
+              </a:ext>
+            </a:extLst>
+          </a:blip>
+          <a:stretch>
+            <a:fillRect/>
+          </a:stretch>
+        </p:blipFill>
+        <p:spPr>
+          <a:xfrm>
+            <a:off x="568455" y="779723"/>
+            <a:ext cx="6153150" cy="4638675"/>
+          </a:xfrm>
+          <a:prstGeom prst="rect">
+            <a:avLst/>
+          </a:prstGeom>
+        </p:spPr>
+      </p:pic>
+    </p:spTree>
+    <p:extLst>
+      <p:ext uri="{BB962C8B-B14F-4D97-AF65-F5344CB8AC3E}">
+        <p14:creationId xmlns:p14="http://schemas.microsoft.com/office/powerpoint/2010/main" val="2425086958"/>
+      </p:ext>
+    </p:extLst>
+  </p:cSld>
+  <p:clrMapOvr>
+    <a:masterClrMapping/>
+  </p:clrMapOvr>
+</p:sld>
+</file>
+
+<file path=ppt/slides/slide9.xml><?xml version="1.0" encoding="utf-8"?>
+<p:sld xmlns:a="http://schemas.openxmlformats.org/drawingml/2006/main" xmlns:r="http://schemas.openxmlformats.org/officeDocument/2006/relationships" xmlns:p="http://schemas.openxmlformats.org/presentationml/2006/main">
+  <p:cSld>
+    <p:spTree>
+      <p:nvGrpSpPr>
+        <p:cNvPr id="1" name=""/>
+        <p:cNvGrpSpPr/>
+        <p:nvPr/>
+      </p:nvGrpSpPr>
+      <p:grpSpPr>
+        <a:xfrm>
+          <a:off x="0" y="0"/>
+          <a:ext cx="0" cy="0"/>
+          <a:chOff x="0" y="0"/>
+          <a:chExt cx="0" cy="0"/>
+        </a:xfrm>
+      </p:grpSpPr>
+      <p:sp>
+        <p:nvSpPr>
+          <p:cNvPr id="2" name="文本框 1">
+            <a:extLst>
+              <a:ext uri="{FF2B5EF4-FFF2-40B4-BE49-F238E27FC236}">
+                <a16:creationId xmlns:a16="http://schemas.microsoft.com/office/drawing/2014/main" id="{391CCB28-AB8A-4E72-B8CC-555D222E8DF9}"/>
+              </a:ext>
+            </a:extLst>
+          </p:cNvPr>
+          <p:cNvSpPr txBox="1"/>
+          <p:nvPr/>
+        </p:nvSpPr>
+        <p:spPr>
+          <a:xfrm>
+            <a:off x="8201320" y="744718"/>
+            <a:ext cx="1847653" cy="369332"/>
+          </a:xfrm>
+          <a:prstGeom prst="rect">
+            <a:avLst/>
+          </a:prstGeom>
+          <a:noFill/>
+        </p:spPr>
+        <p:txBody>
+          <a:bodyPr wrap="square" rtlCol="0">
+            <a:spAutoFit/>
+          </a:bodyPr>
+          <a:lstStyle/>
+          <a:p>
+            <a:r>
+              <a:rPr lang="en-US" altLang="zh-CN" dirty="0"/>
+              <a:t>Ru(OH)2</a:t>
+            </a:r>
+            <a:endParaRPr lang="zh-CN" altLang="en-US" dirty="0"/>
+          </a:p>
+        </p:txBody>
+      </p:sp>
+      <p:pic>
+        <p:nvPicPr>
+          <p:cNvPr id="4" name="图片 3">
+            <a:extLst>
+              <a:ext uri="{FF2B5EF4-FFF2-40B4-BE49-F238E27FC236}">
+                <a16:creationId xmlns:a16="http://schemas.microsoft.com/office/drawing/2014/main" id="{B147746B-EEB2-42F2-ADDF-99A46CB7B4EE}"/>
+              </a:ext>
+            </a:extLst>
+          </p:cNvPr>
+          <p:cNvPicPr>
+            <a:picLocks noChangeAspect="1"/>
+          </p:cNvPicPr>
+          <p:nvPr/>
+        </p:nvPicPr>
+        <p:blipFill>
+          <a:blip r:embed="rId2">
+            <a:extLst>
+              <a:ext uri="{28A0092B-C50C-407E-A947-70E740481C1C}">
+                <a14:useLocalDpi xmlns:a14="http://schemas.microsoft.com/office/drawing/2010/main" val="0"/>
+              </a:ext>
+            </a:extLst>
+          </a:blip>
+          <a:stretch>
+            <a:fillRect/>
+          </a:stretch>
+        </p:blipFill>
+        <p:spPr>
+          <a:xfrm>
+            <a:off x="466479" y="744718"/>
+            <a:ext cx="6734175" cy="4600575"/>
+          </a:xfrm>
+          <a:prstGeom prst="rect">
+            <a:avLst/>
+          </a:prstGeom>
+        </p:spPr>
+      </p:pic>
+      <p:pic>
+        <p:nvPicPr>
+          <p:cNvPr id="6" name="图片 5">
+            <a:extLst>
+              <a:ext uri="{FF2B5EF4-FFF2-40B4-BE49-F238E27FC236}">
+                <a16:creationId xmlns:a16="http://schemas.microsoft.com/office/drawing/2014/main" id="{AA1434F3-1080-4E11-B0BC-405FE3C8F7E0}"/>
+              </a:ext>
+            </a:extLst>
+          </p:cNvPr>
+          <p:cNvPicPr>
+            <a:picLocks noChangeAspect="1"/>
+          </p:cNvPicPr>
+          <p:nvPr/>
+        </p:nvPicPr>
+        <p:blipFill>
+          <a:blip r:embed="rId3">
+            <a:extLst>
+              <a:ext uri="{28A0092B-C50C-407E-A947-70E740481C1C}">
+                <a14:useLocalDpi xmlns:a14="http://schemas.microsoft.com/office/drawing/2010/main" val="0"/>
+              </a:ext>
+            </a:extLst>
+          </a:blip>
+          <a:stretch>
+            <a:fillRect/>
+          </a:stretch>
+        </p:blipFill>
+        <p:spPr>
+          <a:xfrm>
+            <a:off x="7327475" y="1683180"/>
+            <a:ext cx="2099330" cy="2247300"/>
+          </a:xfrm>
+          <a:prstGeom prst="rect">
+            <a:avLst/>
+          </a:prstGeom>
+        </p:spPr>
+      </p:pic>
+      <p:pic>
+        <p:nvPicPr>
+          <p:cNvPr id="10" name="图片 9">
+            <a:extLst>
+              <a:ext uri="{FF2B5EF4-FFF2-40B4-BE49-F238E27FC236}">
+                <a16:creationId xmlns:a16="http://schemas.microsoft.com/office/drawing/2014/main" id="{9602DF2E-F988-4242-AB7D-776AFA892CEB}"/>
+              </a:ext>
+            </a:extLst>
+          </p:cNvPr>
+          <p:cNvPicPr>
+            <a:picLocks noChangeAspect="1"/>
+          </p:cNvPicPr>
+          <p:nvPr/>
+        </p:nvPicPr>
+        <p:blipFill>
+          <a:blip r:embed="rId4">
+            <a:extLst>
+              <a:ext uri="{28A0092B-C50C-407E-A947-70E740481C1C}">
+                <a14:useLocalDpi xmlns:a14="http://schemas.microsoft.com/office/drawing/2010/main" val="0"/>
+              </a:ext>
+            </a:extLst>
+          </a:blip>
+          <a:stretch>
+            <a:fillRect/>
+          </a:stretch>
+        </p:blipFill>
+        <p:spPr>
+          <a:xfrm>
+            <a:off x="7327475" y="4005803"/>
+            <a:ext cx="3576638" cy="2571750"/>
+          </a:xfrm>
+          <a:prstGeom prst="rect">
+            <a:avLst/>
+          </a:prstGeom>
+        </p:spPr>
+      </p:pic>
+    </p:spTree>
+    <p:extLst>
+      <p:ext uri="{BB962C8B-B14F-4D97-AF65-F5344CB8AC3E}">
+        <p14:creationId xmlns:p14="http://schemas.microsoft.com/office/powerpoint/2010/main" val="2095248732"/>
+      </p:ext>
+    </p:extLst>
+  </p:cSld>
+  <p:clrMapOvr>
+    <a:masterClrMapping/>
+  </p:clrMapOvr>
+</p:sld>
+</file>
+
 <file path=ppt/theme/theme1.xml><?xml version="1.0" encoding="utf-8"?>
 <a:theme xmlns:a="http://schemas.openxmlformats.org/drawingml/2006/main" name="Office 主题​​">
   <a:themeElements>

</xml_diff>